<commit_message>
Added some trivial tweaks to packaging/ci slides
</commit_message>
<xml_diff>
--- a/slides/ZeroVM-pkg-cont-int.pptx
+++ b/slides/ZeroVM-pkg-cont-int.pptx
@@ -13,12 +13,12 @@
   <p:sldIdLst>
     <p:sldId id="289" r:id="rId2"/>
     <p:sldId id="330" r:id="rId3"/>
-    <p:sldId id="326" r:id="rId4"/>
-    <p:sldId id="337" r:id="rId5"/>
-    <p:sldId id="331" r:id="rId6"/>
-    <p:sldId id="332" r:id="rId7"/>
-    <p:sldId id="329" r:id="rId8"/>
-    <p:sldId id="335" r:id="rId9"/>
+    <p:sldId id="338" r:id="rId4"/>
+    <p:sldId id="326" r:id="rId5"/>
+    <p:sldId id="337" r:id="rId6"/>
+    <p:sldId id="331" r:id="rId7"/>
+    <p:sldId id="332" r:id="rId8"/>
+    <p:sldId id="329" r:id="rId9"/>
   </p:sldIdLst>
   <p:sldSz cx="9144000" cy="6858000" type="screen4x3"/>
   <p:notesSz cx="6858000" cy="9144000"/>
@@ -207,7 +207,7 @@
                 <a:latin typeface="Helvetica"/>
               </a:rPr>
               <a:pPr/>
-              <a:t>16/1/14</a:t>
+              <a:t>22/1/14</a:t>
             </a:fld>
             <a:endParaRPr lang="en-US" dirty="0">
               <a:latin typeface="Helvetica"/>
@@ -387,7 +387,7 @@
             <a:fld id="{DD75B2DC-CE83-9D4C-91B5-878A853A1E80}" type="datetimeFigureOut">
               <a:rPr lang="en-US" smtClean="0"/>
               <a:pPr/>
-              <a:t>16/1/14</a:t>
+              <a:t>22/1/14</a:t>
             </a:fld>
             <a:endParaRPr lang="en-US" dirty="0"/>
           </a:p>
@@ -705,20 +705,6 @@
           <a:bodyPr/>
           <a:lstStyle/>
           <a:p>
-            <a:r>
-              <a:rPr lang="en-US" dirty="0" smtClean="0"/>
-              <a:t>Developed</a:t>
-            </a:r>
-            <a:r>
-              <a:rPr lang="en-US" baseline="0" dirty="0" smtClean="0"/>
-              <a:t> software for avionics and earthquake hazard analysis</a:t>
-            </a:r>
-          </a:p>
-          <a:p>
-            <a:r>
-              <a:rPr lang="en-US" baseline="0" dirty="0" smtClean="0"/>
-              <a:t>	and now cloud because why not?</a:t>
-            </a:r>
             <a:endParaRPr lang="en-US" dirty="0"/>
           </a:p>
         </p:txBody>
@@ -804,34 +790,6 @@
           <a:bodyPr/>
           <a:lstStyle/>
           <a:p>
-            <a:r>
-              <a:rPr lang="en-US" dirty="0" smtClean="0"/>
-              <a:t>So,</a:t>
-            </a:r>
-            <a:r>
-              <a:rPr lang="en-US" baseline="0" dirty="0" smtClean="0"/>
-              <a:t> let me s</a:t>
-            </a:r>
-            <a:r>
-              <a:rPr lang="en-US" dirty="0" smtClean="0"/>
-              <a:t>tart off by telling you what we DON’T want</a:t>
-            </a:r>
-          </a:p>
-          <a:p>
-            <a:r>
-              <a:rPr lang="en-US" dirty="0" smtClean="0"/>
-              <a:t>We</a:t>
-            </a:r>
-            <a:r>
-              <a:rPr lang="en-US" baseline="0" dirty="0" smtClean="0"/>
-              <a:t> don’t want application developers feeling like this</a:t>
-            </a:r>
-          </a:p>
-          <a:p>
-            <a:r>
-              <a:rPr lang="en-US" baseline="0" dirty="0" smtClean="0"/>
-              <a:t>See, he’s just staring at a Windows login screen, he doesn’t know what to do</a:t>
-            </a:r>
             <a:endParaRPr lang="en-US" dirty="0"/>
           </a:p>
         </p:txBody>
@@ -863,7 +821,7 @@
     </p:spTree>
     <p:extLst>
       <p:ext uri="{BB962C8B-B14F-4D97-AF65-F5344CB8AC3E}">
-        <p14:creationId xmlns:p14="http://schemas.microsoft.com/office/powerpoint/2010/main" val="2849455419"/>
+        <p14:creationId xmlns:p14="http://schemas.microsoft.com/office/powerpoint/2010/main" val="3702835447"/>
       </p:ext>
     </p:extLst>
   </p:cSld>
@@ -919,147 +877,33 @@
           <a:p>
             <a:r>
               <a:rPr lang="en-US" dirty="0" smtClean="0"/>
-              <a:t>Provide “stable” and “latest” packages</a:t>
-            </a:r>
-          </a:p>
-          <a:p>
+              <a:t>So,</a:t>
+            </a:r>
+            <a:r>
+              <a:rPr lang="en-US" baseline="0" dirty="0" smtClean="0"/>
+              <a:t> let me s</a:t>
+            </a:r>
             <a:r>
               <a:rPr lang="en-US" dirty="0" smtClean="0"/>
-              <a:t>	daily / “</a:t>
-            </a:r>
-            <a:r>
-              <a:rPr lang="en-US" dirty="0" err="1" smtClean="0"/>
-              <a:t>mergely</a:t>
-            </a:r>
+              <a:t>tart off by telling you what we DON’T want</a:t>
+            </a:r>
+          </a:p>
+          <a:p>
             <a:r>
               <a:rPr lang="en-US" dirty="0" smtClean="0"/>
-              <a:t>” builds +</a:t>
+              <a:t>We</a:t>
             </a:r>
             <a:r>
               <a:rPr lang="en-US" baseline="0" dirty="0" smtClean="0"/>
-              <a:t> frequent stable builds</a:t>
-            </a:r>
-            <a:endParaRPr lang="en-US" dirty="0" smtClean="0"/>
-          </a:p>
-          <a:p>
-            <a:r>
-              <a:rPr lang="en-US" dirty="0" smtClean="0"/>
-              <a:t>deb and rpm</a:t>
-            </a:r>
-          </a:p>
-          <a:p>
-            <a:r>
-              <a:rPr lang="en-US" dirty="0" smtClean="0"/>
-              <a:t>	For</a:t>
-            </a:r>
+              <a:t> don’t want application developers feeling like this</a:t>
+            </a:r>
+          </a:p>
+          <a:p>
             <a:r>
               <a:rPr lang="en-US" baseline="0" dirty="0" smtClean="0"/>
-              <a:t> now, since this caters to two common </a:t>
-            </a:r>
-            <a:r>
-              <a:rPr lang="en-US" baseline="0" dirty="0" err="1" smtClean="0"/>
-              <a:t>distros</a:t>
-            </a:r>
-            <a:endParaRPr lang="en-US" baseline="0" dirty="0" smtClean="0"/>
-          </a:p>
-          <a:p>
-            <a:r>
-              <a:rPr lang="en-US" baseline="0" dirty="0" smtClean="0"/>
-              <a:t>	Add more </a:t>
-            </a:r>
-            <a:r>
-              <a:rPr lang="en-US" baseline="0" dirty="0" err="1" smtClean="0"/>
-              <a:t>distros</a:t>
-            </a:r>
-            <a:r>
-              <a:rPr lang="en-US" baseline="0" dirty="0" smtClean="0"/>
-              <a:t> as needed</a:t>
-            </a:r>
-          </a:p>
-          <a:p>
-            <a:r>
-              <a:rPr lang="en-US" baseline="0" dirty="0" smtClean="0"/>
-              <a:t>	</a:t>
-            </a:r>
-          </a:p>
-          <a:p>
-            <a:r>
-              <a:rPr lang="en-US" baseline="0" dirty="0" smtClean="0"/>
-              <a:t>Which leads to…</a:t>
-            </a:r>
-          </a:p>
-          <a:p>
-            <a:endParaRPr lang="en-US" dirty="0" smtClean="0"/>
-          </a:p>
-          <a:p>
-            <a:r>
-              <a:rPr lang="en-US" dirty="0" smtClean="0"/>
-              <a:t>Use </a:t>
-            </a:r>
-            <a:r>
-              <a:rPr lang="en-US" dirty="0" err="1" smtClean="0"/>
-              <a:t>openSUSE</a:t>
-            </a:r>
-            <a:r>
-              <a:rPr lang="en-US" dirty="0" smtClean="0"/>
-              <a:t> Build Service</a:t>
-            </a:r>
-          </a:p>
-          <a:p>
-            <a:r>
-              <a:rPr lang="en-US" dirty="0" smtClean="0"/>
-              <a:t>	To make it easy to produce packages for multiple</a:t>
-            </a:r>
-            <a:r>
-              <a:rPr lang="en-US" baseline="0" dirty="0" smtClean="0"/>
-              <a:t> </a:t>
-            </a:r>
-            <a:r>
-              <a:rPr lang="en-US" dirty="0" err="1" smtClean="0"/>
-              <a:t>distros</a:t>
-            </a:r>
-            <a:endParaRPr lang="en-US" dirty="0" smtClean="0"/>
-          </a:p>
-          <a:p>
-            <a:endParaRPr lang="en-US" dirty="0" smtClean="0"/>
-          </a:p>
-          <a:p>
-            <a:r>
-              <a:rPr lang="en-US" dirty="0" smtClean="0"/>
-              <a:t>Release notes</a:t>
-            </a:r>
-          </a:p>
-          <a:p>
-            <a:r>
-              <a:rPr lang="en-US" dirty="0" smtClean="0"/>
-              <a:t>	What’s new?</a:t>
-            </a:r>
-          </a:p>
-          <a:p>
-            <a:r>
-              <a:rPr lang="en-US" dirty="0" smtClean="0"/>
-              <a:t>	Bugs fixed?</a:t>
-            </a:r>
-          </a:p>
-          <a:p>
-            <a:r>
-              <a:rPr lang="en-US" dirty="0" smtClean="0"/>
-              <a:t>Quality &amp; stability</a:t>
-            </a:r>
-          </a:p>
-          <a:p>
-            <a:r>
-              <a:rPr lang="en-US" dirty="0" smtClean="0"/>
-              <a:t>	Install</a:t>
-            </a:r>
-            <a:r>
-              <a:rPr lang="en-US" baseline="0" dirty="0" smtClean="0"/>
-              <a:t> the package, expect it to work</a:t>
-            </a:r>
-            <a:endParaRPr lang="en-US" dirty="0" smtClean="0"/>
-          </a:p>
-          <a:p>
-            <a:endParaRPr lang="en-US" baseline="0" dirty="0" smtClean="0"/>
+              <a:t>See, he’s just staring at a Windows login screen, he doesn’t know what to do</a:t>
+            </a:r>
+            <a:endParaRPr lang="en-US" dirty="0"/>
           </a:p>
         </p:txBody>
       </p:sp>
@@ -1090,7 +934,7 @@
     </p:spTree>
     <p:extLst>
       <p:ext uri="{BB962C8B-B14F-4D97-AF65-F5344CB8AC3E}">
-        <p14:creationId xmlns:p14="http://schemas.microsoft.com/office/powerpoint/2010/main" val="4244662218"/>
+        <p14:creationId xmlns:p14="http://schemas.microsoft.com/office/powerpoint/2010/main" val="2849455419"/>
       </p:ext>
     </p:extLst>
   </p:cSld>
@@ -1146,134 +990,147 @@
           <a:p>
             <a:r>
               <a:rPr lang="en-US" dirty="0" smtClean="0"/>
-              <a:t>What we have so far</a:t>
+              <a:t>Provide “stable” and “latest” packages</a:t>
             </a:r>
           </a:p>
           <a:p>
             <a:r>
               <a:rPr lang="en-US" dirty="0" smtClean="0"/>
-              <a:t>It’s still very basic</a:t>
+              <a:t>	daily / “</a:t>
+            </a:r>
+            <a:r>
+              <a:rPr lang="en-US" dirty="0" err="1" smtClean="0"/>
+              <a:t>mergely</a:t>
+            </a:r>
+            <a:r>
+              <a:rPr lang="en-US" dirty="0" smtClean="0"/>
+              <a:t>” builds +</a:t>
             </a:r>
             <a:r>
               <a:rPr lang="en-US" baseline="0" dirty="0" smtClean="0"/>
-              <a:t> and needs work</a:t>
+              <a:t> frequent stable builds</a:t>
             </a:r>
             <a:endParaRPr lang="en-US" dirty="0" smtClean="0"/>
           </a:p>
           <a:p>
             <a:r>
               <a:rPr lang="en-US" dirty="0" smtClean="0"/>
-              <a:t>Well-known</a:t>
+              <a:t>deb and rpm</a:t>
+            </a:r>
+          </a:p>
+          <a:p>
+            <a:r>
+              <a:rPr lang="en-US" dirty="0" smtClean="0"/>
+              <a:t>	For</a:t>
             </a:r>
             <a:r>
               <a:rPr lang="en-US" baseline="0" dirty="0" smtClean="0"/>
-              <a:t> tools</a:t>
-            </a:r>
-          </a:p>
-          <a:p>
-            <a:endParaRPr lang="en-US" dirty="0" smtClean="0"/>
-          </a:p>
-          <a:p>
-            <a:r>
-              <a:rPr lang="en-US" dirty="0" err="1" smtClean="0"/>
-              <a:t>GitHub</a:t>
-            </a:r>
-            <a:r>
-              <a:rPr lang="en-US" dirty="0" smtClean="0"/>
-              <a:t>:</a:t>
-            </a:r>
-          </a:p>
-          <a:p>
-            <a:r>
-              <a:rPr lang="en-US" dirty="0" smtClean="0"/>
-              <a:t>	code hosting</a:t>
-            </a:r>
-          </a:p>
-          <a:p>
-            <a:r>
-              <a:rPr lang="en-US" dirty="0" smtClean="0"/>
-              <a:t>	issue tracking</a:t>
-            </a:r>
-          </a:p>
-          <a:p>
-            <a:r>
-              <a:rPr lang="en-US" dirty="0" smtClean="0"/>
-              <a:t>Jenkins:</a:t>
-            </a:r>
-          </a:p>
-          <a:p>
-            <a:r>
-              <a:rPr lang="en-US" dirty="0" smtClean="0"/>
-              <a:t>	build and test</a:t>
+              <a:t> now, since this caters to two common </a:t>
+            </a:r>
+            <a:r>
+              <a:rPr lang="en-US" baseline="0" dirty="0" err="1" smtClean="0"/>
+              <a:t>distros</a:t>
             </a:r>
             <a:endParaRPr lang="en-US" baseline="0" dirty="0" smtClean="0"/>
+          </a:p>
+          <a:p>
+            <a:r>
+              <a:rPr lang="en-US" baseline="0" dirty="0" smtClean="0"/>
+              <a:t>	Add more </a:t>
+            </a:r>
+            <a:r>
+              <a:rPr lang="en-US" baseline="0" dirty="0" err="1" smtClean="0"/>
+              <a:t>distros</a:t>
+            </a:r>
+            <a:r>
+              <a:rPr lang="en-US" baseline="0" dirty="0" smtClean="0"/>
+              <a:t> as needed</a:t>
+            </a:r>
           </a:p>
           <a:p>
             <a:r>
               <a:rPr lang="en-US" baseline="0" dirty="0" smtClean="0"/>
               <a:t>	</a:t>
             </a:r>
+          </a:p>
+          <a:p>
+            <a:r>
+              <a:rPr lang="en-US" baseline="0" dirty="0" smtClean="0"/>
+              <a:t>Which leads to…</a:t>
+            </a:r>
+          </a:p>
+          <a:p>
+            <a:endParaRPr lang="en-US" dirty="0" smtClean="0"/>
+          </a:p>
+          <a:p>
             <a:r>
               <a:rPr lang="en-US" dirty="0" smtClean="0"/>
-              <a:t>self-managed, hosted on Rackspace Cloud Servers</a:t>
-            </a:r>
-          </a:p>
-          <a:p>
+              <a:t>Use </a:t>
+            </a:r>
+            <a:r>
+              <a:rPr lang="en-US" dirty="0" err="1" smtClean="0"/>
+              <a:t>openSUSE</a:t>
+            </a:r>
             <a:r>
               <a:rPr lang="en-US" dirty="0" smtClean="0"/>
-              <a:t>	plug-ins for </a:t>
-            </a:r>
-            <a:r>
-              <a:rPr lang="en-US" dirty="0" err="1" smtClean="0"/>
-              <a:t>GitHub</a:t>
-            </a:r>
-            <a:r>
-              <a:rPr lang="en-US" baseline="0" dirty="0" smtClean="0"/>
-              <a:t> integration</a:t>
-            </a:r>
-            <a:endParaRPr lang="en-US" dirty="0" smtClean="0"/>
+              <a:t> Build Service</a:t>
+            </a:r>
           </a:p>
           <a:p>
             <a:r>
               <a:rPr lang="en-US" dirty="0" smtClean="0"/>
-              <a:t>LXC:</a:t>
-            </a:r>
-          </a:p>
-          <a:p>
-            <a:r>
-              <a:rPr lang="en-US" dirty="0" smtClean="0"/>
-              <a:t>	provides</a:t>
+              <a:t>	To make it easy to produce packages for multiple</a:t>
             </a:r>
             <a:r>
               <a:rPr lang="en-US" baseline="0" dirty="0" smtClean="0"/>
               <a:t> </a:t>
             </a:r>
             <a:r>
+              <a:rPr lang="en-US" dirty="0" err="1" smtClean="0"/>
+              <a:t>distros</a:t>
+            </a:r>
+            <a:endParaRPr lang="en-US" dirty="0" smtClean="0"/>
+          </a:p>
+          <a:p>
+            <a:endParaRPr lang="en-US" dirty="0" smtClean="0"/>
+          </a:p>
+          <a:p>
+            <a:r>
               <a:rPr lang="en-US" dirty="0" smtClean="0"/>
-              <a:t>clean build environments and encapsulation </a:t>
+              <a:t>Release notes</a:t>
             </a:r>
           </a:p>
           <a:p>
             <a:r>
               <a:rPr lang="en-US" dirty="0" smtClean="0"/>
-              <a:t>	could</a:t>
+              <a:t>	What’s new?</a:t>
+            </a:r>
+          </a:p>
+          <a:p>
+            <a:r>
+              <a:rPr lang="en-US" dirty="0" smtClean="0"/>
+              <a:t>	Bugs fixed?</a:t>
+            </a:r>
+          </a:p>
+          <a:p>
+            <a:r>
+              <a:rPr lang="en-US" dirty="0" smtClean="0"/>
+              <a:t>Quality &amp; stability</a:t>
+            </a:r>
+          </a:p>
+          <a:p>
+            <a:r>
+              <a:rPr lang="en-US" dirty="0" smtClean="0"/>
+              <a:t>	Install</a:t>
             </a:r>
             <a:r>
               <a:rPr lang="en-US" baseline="0" dirty="0" smtClean="0"/>
-              <a:t> be replaced with something else (</a:t>
-            </a:r>
-            <a:r>
-              <a:rPr lang="en-US" baseline="0" dirty="0" err="1" smtClean="0"/>
-              <a:t>OpenStack</a:t>
-            </a:r>
-            <a:r>
-              <a:rPr lang="en-US" baseline="0" dirty="0" smtClean="0"/>
-              <a:t>, Cloud Servers, etc.)</a:t>
+              <a:t> the package, expect it to work</a:t>
             </a:r>
             <a:endParaRPr lang="en-US" dirty="0" smtClean="0"/>
           </a:p>
           <a:p>
-            <a:endParaRPr lang="en-US" dirty="0"/>
+            <a:endParaRPr lang="en-US" baseline="0" dirty="0" smtClean="0"/>
           </a:p>
         </p:txBody>
       </p:sp>
@@ -1304,7 +1161,7 @@
     </p:spTree>
     <p:extLst>
       <p:ext uri="{BB962C8B-B14F-4D97-AF65-F5344CB8AC3E}">
-        <p14:creationId xmlns:p14="http://schemas.microsoft.com/office/powerpoint/2010/main" val="1683945685"/>
+        <p14:creationId xmlns:p14="http://schemas.microsoft.com/office/powerpoint/2010/main" val="4244662218"/>
       </p:ext>
     </p:extLst>
   </p:cSld>
@@ -1360,83 +1217,131 @@
           <a:p>
             <a:r>
               <a:rPr lang="en-US" dirty="0" smtClean="0"/>
-              <a:t>Typical workflow</a:t>
-            </a:r>
-          </a:p>
-          <a:p>
+              <a:t>What we have so far</a:t>
+            </a:r>
+          </a:p>
+          <a:p>
+            <a:r>
+              <a:rPr lang="en-US" dirty="0" smtClean="0"/>
+              <a:t>It’s still very basic</a:t>
+            </a:r>
+            <a:r>
+              <a:rPr lang="en-US" baseline="0" dirty="0" smtClean="0"/>
+              <a:t> and needs work</a:t>
+            </a:r>
             <a:endParaRPr lang="en-US" dirty="0" smtClean="0"/>
           </a:p>
           <a:p>
             <a:r>
               <a:rPr lang="en-US" dirty="0" smtClean="0"/>
-              <a:t>Continuous integration / test / packaging</a:t>
-            </a:r>
-          </a:p>
-          <a:p>
+              <a:t>Well-known</a:t>
+            </a:r>
+            <a:r>
+              <a:rPr lang="en-US" baseline="0" dirty="0" smtClean="0"/>
+              <a:t> tools</a:t>
+            </a:r>
+          </a:p>
+          <a:p>
+            <a:endParaRPr lang="en-US" dirty="0" smtClean="0"/>
+          </a:p>
+          <a:p>
+            <a:r>
+              <a:rPr lang="en-US" dirty="0" err="1" smtClean="0"/>
+              <a:t>GitHub</a:t>
+            </a:r>
             <a:r>
               <a:rPr lang="en-US" dirty="0" smtClean="0"/>
-              <a:t>CI on pull requests</a:t>
+              <a:t>:</a:t>
             </a:r>
           </a:p>
           <a:p>
             <a:r>
               <a:rPr lang="en-US" dirty="0" smtClean="0"/>
-              <a:t>Topic branches</a:t>
-            </a:r>
-          </a:p>
-          <a:p>
-            <a:r>
-              <a:rPr lang="en-US" dirty="0" smtClean="0">
-                <a:sym typeface="Wingdings"/>
-              </a:rPr>
-              <a:t>Code reviews?</a:t>
-            </a:r>
-          </a:p>
-          <a:p>
-            <a:endParaRPr lang="en-US" dirty="0" smtClean="0">
-              <a:sym typeface="Wingdings"/>
-            </a:endParaRPr>
-          </a:p>
-          <a:p>
-            <a:r>
-              <a:rPr lang="en-US" dirty="0" smtClean="0">
-                <a:sym typeface="Wingdings"/>
-              </a:rPr>
-              <a:t>Actually do</a:t>
-            </a:r>
-            <a:r>
-              <a:rPr lang="en-US" baseline="0" dirty="0" smtClean="0">
-                <a:sym typeface="Wingdings"/>
-              </a:rPr>
-              <a:t> a fork/topic branch demo -&gt; editing README</a:t>
-            </a:r>
-          </a:p>
-          <a:p>
-            <a:r>
-              <a:rPr lang="en-US" baseline="0" dirty="0" smtClean="0">
-                <a:sym typeface="Wingdings"/>
-              </a:rPr>
-              <a:t>	master</a:t>
-            </a:r>
-          </a:p>
-          <a:p>
-            <a:r>
-              <a:rPr lang="en-US" baseline="0" dirty="0" smtClean="0">
-                <a:sym typeface="Wingdings"/>
-              </a:rPr>
-              <a:t>	topic branch</a:t>
-            </a:r>
-          </a:p>
-          <a:p>
-            <a:r>
-              <a:rPr lang="en-US" baseline="0" dirty="0" smtClean="0">
-                <a:sym typeface="Wingdings"/>
-              </a:rPr>
-              <a:t>	pull request</a:t>
-            </a:r>
-            <a:endParaRPr lang="en-US" dirty="0" smtClean="0">
-              <a:sym typeface="Wingdings"/>
-            </a:endParaRPr>
+              <a:t>	code hosting</a:t>
+            </a:r>
+          </a:p>
+          <a:p>
+            <a:r>
+              <a:rPr lang="en-US" dirty="0" smtClean="0"/>
+              <a:t>	issue tracking</a:t>
+            </a:r>
+          </a:p>
+          <a:p>
+            <a:r>
+              <a:rPr lang="en-US" dirty="0" smtClean="0"/>
+              <a:t>Jenkins:</a:t>
+            </a:r>
+          </a:p>
+          <a:p>
+            <a:r>
+              <a:rPr lang="en-US" dirty="0" smtClean="0"/>
+              <a:t>	build and test</a:t>
+            </a:r>
+            <a:endParaRPr lang="en-US" baseline="0" dirty="0" smtClean="0"/>
+          </a:p>
+          <a:p>
+            <a:r>
+              <a:rPr lang="en-US" baseline="0" dirty="0" smtClean="0"/>
+              <a:t>	</a:t>
+            </a:r>
+            <a:r>
+              <a:rPr lang="en-US" dirty="0" smtClean="0"/>
+              <a:t>self-managed, hosted on Rackspace Cloud Servers</a:t>
+            </a:r>
+          </a:p>
+          <a:p>
+            <a:r>
+              <a:rPr lang="en-US" dirty="0" smtClean="0"/>
+              <a:t>	plug-ins for </a:t>
+            </a:r>
+            <a:r>
+              <a:rPr lang="en-US" dirty="0" err="1" smtClean="0"/>
+              <a:t>GitHub</a:t>
+            </a:r>
+            <a:r>
+              <a:rPr lang="en-US" baseline="0" dirty="0" smtClean="0"/>
+              <a:t> integration</a:t>
+            </a:r>
+            <a:endParaRPr lang="en-US" dirty="0" smtClean="0"/>
+          </a:p>
+          <a:p>
+            <a:r>
+              <a:rPr lang="en-US" dirty="0" smtClean="0"/>
+              <a:t>LXC:</a:t>
+            </a:r>
+          </a:p>
+          <a:p>
+            <a:r>
+              <a:rPr lang="en-US" dirty="0" smtClean="0"/>
+              <a:t>	provides</a:t>
+            </a:r>
+            <a:r>
+              <a:rPr lang="en-US" baseline="0" dirty="0" smtClean="0"/>
+              <a:t> </a:t>
+            </a:r>
+            <a:r>
+              <a:rPr lang="en-US" dirty="0" smtClean="0"/>
+              <a:t>clean build environments and encapsulation </a:t>
+            </a:r>
+          </a:p>
+          <a:p>
+            <a:r>
+              <a:rPr lang="en-US" dirty="0" smtClean="0"/>
+              <a:t>	could</a:t>
+            </a:r>
+            <a:r>
+              <a:rPr lang="en-US" baseline="0" dirty="0" smtClean="0"/>
+              <a:t> be replaced with something else (</a:t>
+            </a:r>
+            <a:r>
+              <a:rPr lang="en-US" baseline="0" dirty="0" err="1" smtClean="0"/>
+              <a:t>OpenStack</a:t>
+            </a:r>
+            <a:r>
+              <a:rPr lang="en-US" baseline="0" dirty="0" smtClean="0"/>
+              <a:t>, Cloud Servers, etc.)</a:t>
+            </a:r>
+            <a:endParaRPr lang="en-US" dirty="0" smtClean="0"/>
           </a:p>
           <a:p>
             <a:endParaRPr lang="en-US" dirty="0"/>
@@ -1470,7 +1375,7 @@
     </p:spTree>
     <p:extLst>
       <p:ext uri="{BB962C8B-B14F-4D97-AF65-F5344CB8AC3E}">
-        <p14:creationId xmlns:p14="http://schemas.microsoft.com/office/powerpoint/2010/main" val="2482256804"/>
+        <p14:creationId xmlns:p14="http://schemas.microsoft.com/office/powerpoint/2010/main" val="1683945685"/>
       </p:ext>
     </p:extLst>
   </p:cSld>
@@ -1524,6 +1429,172 @@
           <a:bodyPr/>
           <a:lstStyle/>
           <a:p>
+            <a:r>
+              <a:rPr lang="en-US" dirty="0" smtClean="0"/>
+              <a:t>Typical workflow</a:t>
+            </a:r>
+          </a:p>
+          <a:p>
+            <a:endParaRPr lang="en-US" dirty="0" smtClean="0"/>
+          </a:p>
+          <a:p>
+            <a:r>
+              <a:rPr lang="en-US" dirty="0" smtClean="0"/>
+              <a:t>Continuous integration / test / packaging</a:t>
+            </a:r>
+          </a:p>
+          <a:p>
+            <a:r>
+              <a:rPr lang="en-US" dirty="0" smtClean="0"/>
+              <a:t>CI on pull requests</a:t>
+            </a:r>
+          </a:p>
+          <a:p>
+            <a:r>
+              <a:rPr lang="en-US" dirty="0" smtClean="0"/>
+              <a:t>Topic branches</a:t>
+            </a:r>
+          </a:p>
+          <a:p>
+            <a:r>
+              <a:rPr lang="en-US" dirty="0" smtClean="0">
+                <a:sym typeface="Wingdings"/>
+              </a:rPr>
+              <a:t>Code reviews?</a:t>
+            </a:r>
+          </a:p>
+          <a:p>
+            <a:endParaRPr lang="en-US" dirty="0" smtClean="0">
+              <a:sym typeface="Wingdings"/>
+            </a:endParaRPr>
+          </a:p>
+          <a:p>
+            <a:r>
+              <a:rPr lang="en-US" dirty="0" smtClean="0">
+                <a:sym typeface="Wingdings"/>
+              </a:rPr>
+              <a:t>Actually do</a:t>
+            </a:r>
+            <a:r>
+              <a:rPr lang="en-US" baseline="0" dirty="0" smtClean="0">
+                <a:sym typeface="Wingdings"/>
+              </a:rPr>
+              <a:t> a fork/topic branch demo -&gt; editing README</a:t>
+            </a:r>
+          </a:p>
+          <a:p>
+            <a:r>
+              <a:rPr lang="en-US" baseline="0" dirty="0" smtClean="0">
+                <a:sym typeface="Wingdings"/>
+              </a:rPr>
+              <a:t>	master</a:t>
+            </a:r>
+          </a:p>
+          <a:p>
+            <a:r>
+              <a:rPr lang="en-US" baseline="0" dirty="0" smtClean="0">
+                <a:sym typeface="Wingdings"/>
+              </a:rPr>
+              <a:t>	topic branch</a:t>
+            </a:r>
+          </a:p>
+          <a:p>
+            <a:r>
+              <a:rPr lang="en-US" baseline="0" dirty="0" smtClean="0">
+                <a:sym typeface="Wingdings"/>
+              </a:rPr>
+              <a:t>	pull request</a:t>
+            </a:r>
+            <a:endParaRPr lang="en-US" dirty="0" smtClean="0">
+              <a:sym typeface="Wingdings"/>
+            </a:endParaRPr>
+          </a:p>
+          <a:p>
+            <a:endParaRPr lang="en-US" dirty="0"/>
+          </a:p>
+        </p:txBody>
+      </p:sp>
+      <p:sp>
+        <p:nvSpPr>
+          <p:cNvPr id="4" name="Slide Number Placeholder 3"/>
+          <p:cNvSpPr>
+            <a:spLocks noGrp="1"/>
+          </p:cNvSpPr>
+          <p:nvPr>
+            <p:ph type="sldNum" sz="quarter" idx="10"/>
+          </p:nvPr>
+        </p:nvSpPr>
+        <p:spPr/>
+        <p:txBody>
+          <a:bodyPr/>
+          <a:lstStyle/>
+          <a:p>
+            <a:fld id="{79605AF7-2181-5644-8D44-07249867CC22}" type="slidenum">
+              <a:rPr lang="en-US" smtClean="0"/>
+              <a:pPr/>
+              <a:t>7</a:t>
+            </a:fld>
+            <a:endParaRPr lang="en-US" dirty="0"/>
+          </a:p>
+        </p:txBody>
+      </p:sp>
+    </p:spTree>
+    <p:extLst>
+      <p:ext uri="{BB962C8B-B14F-4D97-AF65-F5344CB8AC3E}">
+        <p14:creationId xmlns:p14="http://schemas.microsoft.com/office/powerpoint/2010/main" val="2482256804"/>
+      </p:ext>
+    </p:extLst>
+  </p:cSld>
+  <p:clrMapOvr>
+    <a:masterClrMapping/>
+  </p:clrMapOvr>
+</p:notes>
+</file>
+
+<file path=ppt/notesSlides/notesSlide7.xml><?xml version="1.0" encoding="utf-8"?>
+<p:notes xmlns:a="http://schemas.openxmlformats.org/drawingml/2006/main" xmlns:r="http://schemas.openxmlformats.org/officeDocument/2006/relationships" xmlns:p="http://schemas.openxmlformats.org/presentationml/2006/main">
+  <p:cSld>
+    <p:spTree>
+      <p:nvGrpSpPr>
+        <p:cNvPr id="1" name=""/>
+        <p:cNvGrpSpPr/>
+        <p:nvPr/>
+      </p:nvGrpSpPr>
+      <p:grpSpPr>
+        <a:xfrm>
+          <a:off x="0" y="0"/>
+          <a:ext cx="0" cy="0"/>
+          <a:chOff x="0" y="0"/>
+          <a:chExt cx="0" cy="0"/>
+        </a:xfrm>
+      </p:grpSpPr>
+      <p:sp>
+        <p:nvSpPr>
+          <p:cNvPr id="2" name="Slide Image Placeholder 1"/>
+          <p:cNvSpPr>
+            <a:spLocks noGrp="1" noRot="1" noChangeAspect="1"/>
+          </p:cNvSpPr>
+          <p:nvPr>
+            <p:ph type="sldImg"/>
+          </p:nvPr>
+        </p:nvSpPr>
+        <p:spPr/>
+      </p:sp>
+      <p:sp>
+        <p:nvSpPr>
+          <p:cNvPr id="3" name="Notes Placeholder 2"/>
+          <p:cNvSpPr>
+            <a:spLocks noGrp="1"/>
+          </p:cNvSpPr>
+          <p:nvPr>
+            <p:ph type="body" idx="1"/>
+          </p:nvPr>
+        </p:nvSpPr>
+        <p:spPr/>
+        <p:txBody>
+          <a:bodyPr/>
+          <a:lstStyle/>
+          <a:p>
             <a:pPr marL="0" marR="0" lvl="1" indent="0" algn="l" defTabSz="457200" rtl="0" eaLnBrk="1" fontAlgn="auto" latinLnBrk="0" hangingPunct="1">
               <a:lnSpc>
                 <a:spcPct val="100000"/>
@@ -1778,7 +1849,7 @@
             <a:fld id="{79605AF7-2181-5644-8D44-07249867CC22}" type="slidenum">
               <a:rPr lang="en-US" smtClean="0"/>
               <a:pPr/>
-              <a:t>7</a:t>
+              <a:t>8</a:t>
             </a:fld>
             <a:endParaRPr lang="en-US" dirty="0"/>
           </a:p>
@@ -2158,7 +2229,7 @@
             <a:fld id="{FFFBEDE2-7F10-0A49-9800-B0198DB4B46B}" type="datetime4">
               <a:rPr lang="en-US" smtClean="0"/>
               <a:pPr/>
-              <a:t>January 16, 2014</a:t>
+              <a:t>January 22, 2014</a:t>
             </a:fld>
             <a:endParaRPr lang="en-US" dirty="0"/>
           </a:p>
@@ -7031,7 +7102,7 @@
             <a:fld id="{FFFBEDE2-7F10-0A49-9800-B0198DB4B46B}" type="datetime4">
               <a:rPr lang="en-US" smtClean="0"/>
               <a:pPr/>
-              <a:t>January 16, 2014</a:t>
+              <a:t>January 22, 2014</a:t>
             </a:fld>
             <a:endParaRPr lang="en-US"/>
           </a:p>
@@ -7724,7 +7795,7 @@
             <a:fld id="{FFFBEDE2-7F10-0A49-9800-B0198DB4B46B}" type="datetime4">
               <a:rPr lang="en-US" smtClean="0"/>
               <a:pPr/>
-              <a:t>January 16, 2014</a:t>
+              <a:t>January 22, 2014</a:t>
             </a:fld>
             <a:endParaRPr lang="en-US" dirty="0"/>
           </a:p>
@@ -11101,6 +11172,13 @@
   <p:clrMapOvr>
     <a:masterClrMapping/>
   </p:clrMapOvr>
+  <p:timing>
+    <p:tnLst>
+      <p:par>
+        <p:cTn xmlns:p14="http://schemas.microsoft.com/office/powerpoint/2010/main" id="1" dur="indefinite" restart="never" nodeType="tmRoot"/>
+      </p:par>
+    </p:tnLst>
+  </p:timing>
 </p:sld>
 </file>
 
@@ -11335,10 +11413,9 @@
           <a:bodyPr/>
           <a:lstStyle/>
           <a:p>
-            <a:pPr marL="0" indent="0">
-              <a:buNone/>
-            </a:pPr>
-            <a:endParaRPr lang="en-US" dirty="0"/>
+            <a:endParaRPr lang="en-US" dirty="0" smtClean="0">
+              <a:sym typeface="Wingdings"/>
+            </a:endParaRPr>
           </a:p>
         </p:txBody>
       </p:sp>
@@ -11376,14 +11453,20 @@
             <p:ph type="title"/>
           </p:nvPr>
         </p:nvSpPr>
-        <p:spPr/>
+        <p:spPr>
+          <a:xfrm>
+            <a:off x="283035" y="3238563"/>
+            <a:ext cx="8229600" cy="380873"/>
+          </a:xfrm>
+        </p:spPr>
         <p:txBody>
           <a:bodyPr/>
           <a:lstStyle/>
           <a:p>
+            <a:pPr algn="ctr"/>
             <a:r>
               <a:rPr lang="en-US" dirty="0" smtClean="0"/>
-              <a:t>Do not want</a:t>
+              <a:t>Why?</a:t>
             </a:r>
             <a:endParaRPr lang="en-US" dirty="0"/>
           </a:p>
@@ -11408,107 +11491,10 @@
           </a:p>
         </p:txBody>
       </p:sp>
-      <p:sp>
-        <p:nvSpPr>
-          <p:cNvPr id="6" name="TextBox 5"/>
-          <p:cNvSpPr txBox="1"/>
-          <p:nvPr/>
-        </p:nvSpPr>
-        <p:spPr>
-          <a:xfrm>
-            <a:off x="457199" y="5805264"/>
-            <a:ext cx="2962673" cy="276999"/>
-          </a:xfrm>
-          <a:prstGeom prst="rect">
-            <a:avLst/>
-          </a:prstGeom>
-        </p:spPr>
-        <p:txBody>
-          <a:bodyPr wrap="square" lIns="0" tIns="0" rIns="0" bIns="0" rtlCol="0">
-            <a:spAutoFit/>
-          </a:bodyPr>
-          <a:lstStyle/>
-          <a:p>
-            <a:pPr>
-              <a:spcAft>
-                <a:spcPts val="1800"/>
-              </a:spcAft>
-            </a:pPr>
-            <a:endParaRPr lang="en-US" dirty="0" err="1" smtClean="0">
-              <a:latin typeface="Helvetica"/>
-              <a:cs typeface="Helvetica"/>
-            </a:endParaRPr>
-          </a:p>
-        </p:txBody>
-      </p:sp>
-      <p:sp>
-        <p:nvSpPr>
-          <p:cNvPr id="7" name="TextBox 6"/>
-          <p:cNvSpPr txBox="1"/>
-          <p:nvPr/>
-        </p:nvSpPr>
-        <p:spPr>
-          <a:xfrm>
-            <a:off x="457200" y="5854885"/>
-            <a:ext cx="5122912" cy="169277"/>
-          </a:xfrm>
-          <a:prstGeom prst="rect">
-            <a:avLst/>
-          </a:prstGeom>
-        </p:spPr>
-        <p:txBody>
-          <a:bodyPr wrap="square" lIns="0" tIns="0" rIns="0" bIns="0" rtlCol="0">
-            <a:spAutoFit/>
-          </a:bodyPr>
-          <a:lstStyle/>
-          <a:p>
-            <a:pPr>
-              <a:spcAft>
-                <a:spcPts val="1800"/>
-              </a:spcAft>
-            </a:pPr>
-            <a:r>
-              <a:rPr lang="en-US" sz="1100" dirty="0">
-                <a:latin typeface="Helvetica"/>
-                <a:cs typeface="Helvetica"/>
-              </a:rPr>
-              <a:t>Image: http://i1.kym-cdn.com/photos/images/newsfeed/000/234/765/b7e.jpg</a:t>
-            </a:r>
-            <a:endParaRPr lang="en-US" sz="1100" dirty="0" smtClean="0">
-              <a:latin typeface="Helvetica"/>
-              <a:cs typeface="Helvetica"/>
-            </a:endParaRPr>
-          </a:p>
-        </p:txBody>
-      </p:sp>
-      <p:pic>
-        <p:nvPicPr>
-          <p:cNvPr id="8" name="Picture 7"/>
-          <p:cNvPicPr>
-            <a:picLocks noChangeAspect="1"/>
-          </p:cNvPicPr>
-          <p:nvPr/>
-        </p:nvPicPr>
-        <p:blipFill>
-          <a:blip r:embed="rId3"/>
-          <a:stretch>
-            <a:fillRect/>
-          </a:stretch>
-        </p:blipFill>
-        <p:spPr>
-          <a:xfrm>
-            <a:off x="1651000" y="1560838"/>
-            <a:ext cx="5842000" cy="4229100"/>
-          </a:xfrm>
-          <a:prstGeom prst="rect">
-            <a:avLst/>
-          </a:prstGeom>
-        </p:spPr>
-      </p:pic>
     </p:spTree>
     <p:extLst>
       <p:ext uri="{BB962C8B-B14F-4D97-AF65-F5344CB8AC3E}">
-        <p14:creationId xmlns:p14="http://schemas.microsoft.com/office/powerpoint/2010/main" val="1600992413"/>
+        <p14:creationId xmlns:p14="http://schemas.microsoft.com/office/powerpoint/2010/main" val="3342992997"/>
       </p:ext>
     </p:extLst>
   </p:cSld>
@@ -11555,68 +11541,16 @@
         <p:spPr>
           <a:xfrm>
             <a:off x="457200" y="1645920"/>
-            <a:ext cx="8229600" cy="2365263"/>
+            <a:ext cx="8229600" cy="253916"/>
           </a:xfrm>
         </p:spPr>
         <p:txBody>
           <a:bodyPr/>
           <a:lstStyle/>
           <a:p>
-            <a:r>
-              <a:rPr lang="en-US" dirty="0" smtClean="0"/>
-              <a:t>Provide “stable” and “latest” packages</a:t>
-            </a:r>
-          </a:p>
-          <a:p>
-            <a:r>
-              <a:rPr lang="en-US" dirty="0" smtClean="0"/>
-              <a:t>deb and rpm</a:t>
-            </a:r>
-          </a:p>
-          <a:p>
-            <a:r>
-              <a:rPr lang="en-US" dirty="0" smtClean="0"/>
-              <a:t>Use </a:t>
-            </a:r>
-            <a:r>
-              <a:rPr lang="en-US" dirty="0" err="1" smtClean="0"/>
-              <a:t>openSUSE</a:t>
-            </a:r>
-            <a:r>
-              <a:rPr lang="en-US" dirty="0" smtClean="0"/>
-              <a:t> Build Service</a:t>
-            </a:r>
-          </a:p>
-          <a:p>
-            <a:pPr lvl="1"/>
-            <a:r>
-              <a:rPr lang="en-US" dirty="0"/>
-              <a:t>https://</a:t>
-            </a:r>
-            <a:r>
-              <a:rPr lang="en-US" dirty="0" err="1"/>
-              <a:t>build.opensuse.org</a:t>
-            </a:r>
-            <a:r>
-              <a:rPr lang="en-US" dirty="0"/>
-              <a:t>/</a:t>
-            </a:r>
-            <a:endParaRPr lang="en-US" dirty="0" smtClean="0"/>
-          </a:p>
-          <a:p>
-            <a:endParaRPr lang="en-US" dirty="0"/>
-          </a:p>
-          <a:p>
-            <a:r>
-              <a:rPr lang="en-US" dirty="0" smtClean="0"/>
-              <a:t>Release notes</a:t>
-            </a:r>
-          </a:p>
-          <a:p>
-            <a:r>
-              <a:rPr lang="en-US" dirty="0" smtClean="0"/>
-              <a:t>Quality &amp; stability</a:t>
-            </a:r>
+            <a:pPr marL="0" indent="0">
+              <a:buNone/>
+            </a:pPr>
             <a:endParaRPr lang="en-US" dirty="0"/>
           </a:p>
         </p:txBody>
@@ -11662,7 +11596,7 @@
           <a:p>
             <a:r>
               <a:rPr lang="en-US" dirty="0" smtClean="0"/>
-              <a:t>Want</a:t>
+              <a:t>Do not want</a:t>
             </a:r>
             <a:endParaRPr lang="en-US" dirty="0"/>
           </a:p>
@@ -11687,10 +11621,107 @@
           </a:p>
         </p:txBody>
       </p:sp>
+      <p:sp>
+        <p:nvSpPr>
+          <p:cNvPr id="6" name="TextBox 5"/>
+          <p:cNvSpPr txBox="1"/>
+          <p:nvPr/>
+        </p:nvSpPr>
+        <p:spPr>
+          <a:xfrm>
+            <a:off x="457199" y="5805264"/>
+            <a:ext cx="2962673" cy="276999"/>
+          </a:xfrm>
+          <a:prstGeom prst="rect">
+            <a:avLst/>
+          </a:prstGeom>
+        </p:spPr>
+        <p:txBody>
+          <a:bodyPr wrap="square" lIns="0" tIns="0" rIns="0" bIns="0" rtlCol="0">
+            <a:spAutoFit/>
+          </a:bodyPr>
+          <a:lstStyle/>
+          <a:p>
+            <a:pPr>
+              <a:spcAft>
+                <a:spcPts val="1800"/>
+              </a:spcAft>
+            </a:pPr>
+            <a:endParaRPr lang="en-US" dirty="0" err="1" smtClean="0">
+              <a:latin typeface="Helvetica"/>
+              <a:cs typeface="Helvetica"/>
+            </a:endParaRPr>
+          </a:p>
+        </p:txBody>
+      </p:sp>
+      <p:sp>
+        <p:nvSpPr>
+          <p:cNvPr id="7" name="TextBox 6"/>
+          <p:cNvSpPr txBox="1"/>
+          <p:nvPr/>
+        </p:nvSpPr>
+        <p:spPr>
+          <a:xfrm>
+            <a:off x="457200" y="5854885"/>
+            <a:ext cx="5122912" cy="169277"/>
+          </a:xfrm>
+          <a:prstGeom prst="rect">
+            <a:avLst/>
+          </a:prstGeom>
+        </p:spPr>
+        <p:txBody>
+          <a:bodyPr wrap="square" lIns="0" tIns="0" rIns="0" bIns="0" rtlCol="0">
+            <a:spAutoFit/>
+          </a:bodyPr>
+          <a:lstStyle/>
+          <a:p>
+            <a:pPr>
+              <a:spcAft>
+                <a:spcPts val="1800"/>
+              </a:spcAft>
+            </a:pPr>
+            <a:r>
+              <a:rPr lang="en-US" sz="1100" dirty="0">
+                <a:latin typeface="Helvetica"/>
+                <a:cs typeface="Helvetica"/>
+              </a:rPr>
+              <a:t>Image: http://i1.kym-cdn.com/photos/images/newsfeed/000/234/765/b7e.jpg</a:t>
+            </a:r>
+            <a:endParaRPr lang="en-US" sz="1100" dirty="0" smtClean="0">
+              <a:latin typeface="Helvetica"/>
+              <a:cs typeface="Helvetica"/>
+            </a:endParaRPr>
+          </a:p>
+        </p:txBody>
+      </p:sp>
+      <p:pic>
+        <p:nvPicPr>
+          <p:cNvPr id="8" name="Picture 7"/>
+          <p:cNvPicPr>
+            <a:picLocks noChangeAspect="1"/>
+          </p:cNvPicPr>
+          <p:nvPr/>
+        </p:nvPicPr>
+        <p:blipFill>
+          <a:blip r:embed="rId3"/>
+          <a:stretch>
+            <a:fillRect/>
+          </a:stretch>
+        </p:blipFill>
+        <p:spPr>
+          <a:xfrm>
+            <a:off x="1651000" y="1560838"/>
+            <a:ext cx="5842000" cy="4229100"/>
+          </a:xfrm>
+          <a:prstGeom prst="rect">
+            <a:avLst/>
+          </a:prstGeom>
+        </p:spPr>
+      </p:pic>
     </p:spTree>
     <p:extLst>
       <p:ext uri="{BB962C8B-B14F-4D97-AF65-F5344CB8AC3E}">
-        <p14:creationId xmlns:p14="http://schemas.microsoft.com/office/powerpoint/2010/main" val="2162368109"/>
+        <p14:creationId xmlns:p14="http://schemas.microsoft.com/office/powerpoint/2010/main" val="1600992413"/>
       </p:ext>
     </p:extLst>
   </p:cSld>
@@ -11736,6 +11767,198 @@
         </p:nvSpPr>
         <p:spPr>
           <a:xfrm>
+            <a:off x="457200" y="1645920"/>
+            <a:ext cx="8229600" cy="2675605"/>
+          </a:xfrm>
+        </p:spPr>
+        <p:txBody>
+          <a:bodyPr/>
+          <a:lstStyle/>
+          <a:p>
+            <a:r>
+              <a:rPr lang="en-US" dirty="0" smtClean="0"/>
+              <a:t>Prevent broken commits</a:t>
+            </a:r>
+          </a:p>
+          <a:p>
+            <a:r>
+              <a:rPr lang="en-US" dirty="0" smtClean="0"/>
+              <a:t>Provide </a:t>
+            </a:r>
+            <a:r>
+              <a:rPr lang="en-US" dirty="0" smtClean="0"/>
+              <a:t>“stable” and “latest” packages</a:t>
+            </a:r>
+          </a:p>
+          <a:p>
+            <a:r>
+              <a:rPr lang="en-US" dirty="0" smtClean="0"/>
+              <a:t>deb and rpm</a:t>
+            </a:r>
+          </a:p>
+          <a:p>
+            <a:r>
+              <a:rPr lang="en-US" dirty="0" smtClean="0"/>
+              <a:t>Use </a:t>
+            </a:r>
+            <a:r>
+              <a:rPr lang="en-US" dirty="0" err="1" smtClean="0"/>
+              <a:t>openSUSE</a:t>
+            </a:r>
+            <a:r>
+              <a:rPr lang="en-US" dirty="0" smtClean="0"/>
+              <a:t> Build Service</a:t>
+            </a:r>
+          </a:p>
+          <a:p>
+            <a:pPr lvl="1"/>
+            <a:r>
+              <a:rPr lang="en-US" dirty="0"/>
+              <a:t>https://</a:t>
+            </a:r>
+            <a:r>
+              <a:rPr lang="en-US" dirty="0" err="1"/>
+              <a:t>build.opensuse.org</a:t>
+            </a:r>
+            <a:r>
+              <a:rPr lang="en-US" dirty="0"/>
+              <a:t>/</a:t>
+            </a:r>
+            <a:endParaRPr lang="en-US" dirty="0" smtClean="0"/>
+          </a:p>
+          <a:p>
+            <a:endParaRPr lang="en-US" dirty="0"/>
+          </a:p>
+          <a:p>
+            <a:r>
+              <a:rPr lang="en-US" dirty="0" smtClean="0"/>
+              <a:t>Release notes</a:t>
+            </a:r>
+          </a:p>
+          <a:p>
+            <a:r>
+              <a:rPr lang="en-US" dirty="0" smtClean="0"/>
+              <a:t>Quality &amp; stability</a:t>
+            </a:r>
+            <a:endParaRPr lang="en-US" dirty="0"/>
+          </a:p>
+        </p:txBody>
+      </p:sp>
+      <p:sp>
+        <p:nvSpPr>
+          <p:cNvPr id="3" name="Slide Number Placeholder 2"/>
+          <p:cNvSpPr>
+            <a:spLocks noGrp="1"/>
+          </p:cNvSpPr>
+          <p:nvPr>
+            <p:ph type="sldNum" sz="quarter" idx="12"/>
+          </p:nvPr>
+        </p:nvSpPr>
+        <p:spPr/>
+        <p:txBody>
+          <a:bodyPr/>
+          <a:lstStyle/>
+          <a:p>
+            <a:fld id="{F7B308D7-9E65-0248-B131-BDA2090177FC}" type="slidenum">
+              <a:rPr lang="en-US" smtClean="0"/>
+              <a:pPr/>
+              <a:t>5</a:t>
+            </a:fld>
+            <a:endParaRPr lang="en-US"/>
+          </a:p>
+        </p:txBody>
+      </p:sp>
+      <p:sp>
+        <p:nvSpPr>
+          <p:cNvPr id="4" name="Title 3"/>
+          <p:cNvSpPr>
+            <a:spLocks noGrp="1"/>
+          </p:cNvSpPr>
+          <p:nvPr>
+            <p:ph type="title"/>
+          </p:nvPr>
+        </p:nvSpPr>
+        <p:spPr/>
+        <p:txBody>
+          <a:bodyPr/>
+          <a:lstStyle/>
+          <a:p>
+            <a:r>
+              <a:rPr lang="en-US" dirty="0" smtClean="0"/>
+              <a:t>Want</a:t>
+            </a:r>
+            <a:endParaRPr lang="en-US" dirty="0"/>
+          </a:p>
+        </p:txBody>
+      </p:sp>
+      <p:sp>
+        <p:nvSpPr>
+          <p:cNvPr id="5" name="Text Placeholder 4"/>
+          <p:cNvSpPr>
+            <a:spLocks noGrp="1"/>
+          </p:cNvSpPr>
+          <p:nvPr>
+            <p:ph type="body" sz="half" idx="2"/>
+          </p:nvPr>
+        </p:nvSpPr>
+        <p:spPr/>
+        <p:txBody>
+          <a:bodyPr/>
+          <a:lstStyle/>
+          <a:p>
+            <a:endParaRPr lang="en-US"/>
+          </a:p>
+        </p:txBody>
+      </p:sp>
+    </p:spTree>
+    <p:extLst>
+      <p:ext uri="{BB962C8B-B14F-4D97-AF65-F5344CB8AC3E}">
+        <p14:creationId xmlns:p14="http://schemas.microsoft.com/office/powerpoint/2010/main" val="2162368109"/>
+      </p:ext>
+    </p:extLst>
+  </p:cSld>
+  <p:clrMapOvr>
+    <a:masterClrMapping/>
+  </p:clrMapOvr>
+  <p:timing>
+    <p:tnLst>
+      <p:par>
+        <p:cTn xmlns:p14="http://schemas.microsoft.com/office/powerpoint/2010/main" id="1" dur="indefinite" restart="never" nodeType="tmRoot"/>
+      </p:par>
+    </p:tnLst>
+  </p:timing>
+</p:sld>
+</file>
+
+<file path=ppt/slides/slide6.xml><?xml version="1.0" encoding="utf-8"?>
+<p:sld xmlns:a="http://schemas.openxmlformats.org/drawingml/2006/main" xmlns:r="http://schemas.openxmlformats.org/officeDocument/2006/relationships" xmlns:p="http://schemas.openxmlformats.org/presentationml/2006/main">
+  <p:cSld>
+    <p:spTree>
+      <p:nvGrpSpPr>
+        <p:cNvPr id="1" name=""/>
+        <p:cNvGrpSpPr/>
+        <p:nvPr/>
+      </p:nvGrpSpPr>
+      <p:grpSpPr>
+        <a:xfrm>
+          <a:off x="0" y="0"/>
+          <a:ext cx="0" cy="0"/>
+          <a:chOff x="0" y="0"/>
+          <a:chExt cx="0" cy="0"/>
+        </a:xfrm>
+      </p:grpSpPr>
+      <p:sp>
+        <p:nvSpPr>
+          <p:cNvPr id="2" name="Content Placeholder 1"/>
+          <p:cNvSpPr>
+            <a:spLocks noGrp="1"/>
+          </p:cNvSpPr>
+          <p:nvPr>
+            <p:ph idx="1"/>
+          </p:nvPr>
+        </p:nvSpPr>
+        <p:spPr>
+          <a:xfrm>
             <a:off x="457201" y="5431730"/>
             <a:ext cx="8229600" cy="1625573"/>
           </a:xfrm>
@@ -11823,7 +12046,7 @@
             <a:fld id="{F7B308D7-9E65-0248-B131-BDA2090177FC}" type="slidenum">
               <a:rPr lang="en-US" smtClean="0"/>
               <a:pPr/>
-              <a:t>5</a:t>
+              <a:t>6</a:t>
             </a:fld>
             <a:endParaRPr lang="en-US"/>
           </a:p>
@@ -11991,10 +12214,6 @@
               </a:rPr>
               <a:t>+</a:t>
             </a:r>
-            <a:endParaRPr lang="en-US" sz="4400" dirty="0" smtClean="0">
-              <a:latin typeface="Helvetica"/>
-              <a:cs typeface="Helvetica"/>
-            </a:endParaRPr>
           </a:p>
         </p:txBody>
       </p:sp>
@@ -12031,10 +12250,6 @@
               </a:rPr>
               <a:t>+</a:t>
             </a:r>
-            <a:endParaRPr lang="en-US" sz="4400" dirty="0" smtClean="0">
-              <a:latin typeface="Helvetica"/>
-              <a:cs typeface="Helvetica"/>
-            </a:endParaRPr>
           </a:p>
         </p:txBody>
       </p:sp>
@@ -12071,10 +12286,6 @@
               </a:rPr>
               <a:t>LXC</a:t>
             </a:r>
-            <a:endParaRPr lang="en-US" sz="4000" dirty="0" smtClean="0">
-              <a:latin typeface="Helvetica"/>
-              <a:cs typeface="Helvetica"/>
-            </a:endParaRPr>
           </a:p>
         </p:txBody>
       </p:sp>
@@ -12088,10 +12299,17 @@
   <p:clrMapOvr>
     <a:masterClrMapping/>
   </p:clrMapOvr>
+  <p:timing>
+    <p:tnLst>
+      <p:par>
+        <p:cTn xmlns:p14="http://schemas.microsoft.com/office/powerpoint/2010/main" id="1" dur="indefinite" restart="never" nodeType="tmRoot"/>
+      </p:par>
+    </p:tnLst>
+  </p:timing>
 </p:sld>
 </file>
 
-<file path=ppt/slides/slide6.xml><?xml version="1.0" encoding="utf-8"?>
+<file path=ppt/slides/slide7.xml><?xml version="1.0" encoding="utf-8"?>
 <p:sld xmlns:a="http://schemas.openxmlformats.org/drawingml/2006/main" xmlns:r="http://schemas.openxmlformats.org/officeDocument/2006/relationships" xmlns:p="http://schemas.openxmlformats.org/presentationml/2006/main">
   <p:cSld>
     <p:spTree>
@@ -12126,7 +12344,7 @@
             <a:fld id="{F7B308D7-9E65-0248-B131-BDA2090177FC}" type="slidenum">
               <a:rPr lang="en-US" smtClean="0"/>
               <a:pPr/>
-              <a:t>6</a:t>
+              <a:t>7</a:t>
             </a:fld>
             <a:endParaRPr lang="en-US"/>
           </a:p>
@@ -12977,208 +13195,13 @@
   <p:clrMapOvr>
     <a:masterClrMapping/>
   </p:clrMapOvr>
-</p:sld>
-</file>
-
-<file path=ppt/slides/slide7.xml><?xml version="1.0" encoding="utf-8"?>
-<p:sld xmlns:a="http://schemas.openxmlformats.org/drawingml/2006/main" xmlns:r="http://schemas.openxmlformats.org/officeDocument/2006/relationships" xmlns:p="http://schemas.openxmlformats.org/presentationml/2006/main">
-  <p:cSld>
-    <p:spTree>
-      <p:nvGrpSpPr>
-        <p:cNvPr id="1" name=""/>
-        <p:cNvGrpSpPr/>
-        <p:nvPr/>
-      </p:nvGrpSpPr>
-      <p:grpSpPr>
-        <a:xfrm>
-          <a:off x="0" y="0"/>
-          <a:ext cx="0" cy="0"/>
-          <a:chOff x="0" y="0"/>
-          <a:chExt cx="0" cy="0"/>
-        </a:xfrm>
-      </p:grpSpPr>
-      <p:sp>
-        <p:nvSpPr>
-          <p:cNvPr id="2" name="Content Placeholder 1"/>
-          <p:cNvSpPr>
-            <a:spLocks noGrp="1"/>
-          </p:cNvSpPr>
-          <p:nvPr>
-            <p:ph idx="1"/>
-          </p:nvPr>
-        </p:nvSpPr>
-        <p:spPr>
-          <a:xfrm>
-            <a:off x="457200" y="1645920"/>
-            <a:ext cx="8229600" cy="2717154"/>
-          </a:xfrm>
-        </p:spPr>
-        <p:txBody>
-          <a:bodyPr/>
-          <a:lstStyle/>
-          <a:p>
-            <a:r>
-              <a:rPr lang="en-US" dirty="0"/>
-              <a:t>Pull requests as part of </a:t>
-            </a:r>
-            <a:r>
-              <a:rPr lang="en-US" dirty="0" smtClean="0"/>
-              <a:t>workflow (core team)</a:t>
-            </a:r>
-            <a:endParaRPr lang="en-US" dirty="0"/>
-          </a:p>
-          <a:p>
-            <a:r>
-              <a:rPr lang="en-US" dirty="0" smtClean="0"/>
-              <a:t>Better Jenkins </a:t>
-            </a:r>
-            <a:r>
-              <a:rPr lang="en-US" dirty="0"/>
-              <a:t>+ </a:t>
-            </a:r>
-            <a:r>
-              <a:rPr lang="en-US" dirty="0" err="1" smtClean="0"/>
-              <a:t>GitHub</a:t>
-            </a:r>
-            <a:r>
-              <a:rPr lang="en-US" dirty="0" smtClean="0"/>
-              <a:t> integration</a:t>
-            </a:r>
-          </a:p>
-          <a:p>
-            <a:r>
-              <a:rPr lang="en-US" dirty="0"/>
-              <a:t>How to </a:t>
-            </a:r>
-            <a:r>
-              <a:rPr lang="en-US" dirty="0" smtClean="0"/>
-              <a:t>contribute</a:t>
-            </a:r>
-            <a:endParaRPr lang="en-US" dirty="0"/>
-          </a:p>
-          <a:p>
-            <a:r>
-              <a:rPr lang="en-US" dirty="0" smtClean="0"/>
-              <a:t>Commit </a:t>
-            </a:r>
-            <a:r>
-              <a:rPr lang="en-US" dirty="0"/>
-              <a:t>message template</a:t>
-            </a:r>
-          </a:p>
-          <a:p>
-            <a:r>
-              <a:rPr lang="en-US" dirty="0" smtClean="0"/>
-              <a:t>Packages for </a:t>
-            </a:r>
-            <a:r>
-              <a:rPr lang="en-US" dirty="0" err="1" smtClean="0"/>
-              <a:t>zpython</a:t>
-            </a:r>
-            <a:r>
-              <a:rPr lang="en-US" dirty="0" smtClean="0"/>
-              <a:t> + lib dependencies</a:t>
-            </a:r>
-          </a:p>
-          <a:p>
-            <a:r>
-              <a:rPr lang="en-US" dirty="0" smtClean="0"/>
-              <a:t>Naming conventions for packages / repos</a:t>
-            </a:r>
-          </a:p>
-          <a:p>
-            <a:pPr lvl="1"/>
-            <a:r>
-              <a:rPr lang="en-US" dirty="0" err="1" smtClean="0"/>
-              <a:t>zvm</a:t>
-            </a:r>
-            <a:r>
-              <a:rPr lang="en-US" dirty="0" smtClean="0"/>
-              <a:t>-* ?</a:t>
-            </a:r>
-            <a:endParaRPr lang="en-US" dirty="0"/>
-          </a:p>
-          <a:p>
-            <a:endParaRPr lang="en-US" dirty="0"/>
-          </a:p>
-        </p:txBody>
-      </p:sp>
-      <p:sp>
-        <p:nvSpPr>
-          <p:cNvPr id="3" name="Slide Number Placeholder 2"/>
-          <p:cNvSpPr>
-            <a:spLocks noGrp="1"/>
-          </p:cNvSpPr>
-          <p:nvPr>
-            <p:ph type="sldNum" sz="quarter" idx="12"/>
-          </p:nvPr>
-        </p:nvSpPr>
-        <p:spPr/>
-        <p:txBody>
-          <a:bodyPr/>
-          <a:lstStyle/>
-          <a:p>
-            <a:fld id="{F7B308D7-9E65-0248-B131-BDA2090177FC}" type="slidenum">
-              <a:rPr lang="en-US" smtClean="0"/>
-              <a:pPr/>
-              <a:t>7</a:t>
-            </a:fld>
-            <a:endParaRPr lang="en-US"/>
-          </a:p>
-        </p:txBody>
-      </p:sp>
-      <p:sp>
-        <p:nvSpPr>
-          <p:cNvPr id="4" name="Title 3"/>
-          <p:cNvSpPr>
-            <a:spLocks noGrp="1"/>
-          </p:cNvSpPr>
-          <p:nvPr>
-            <p:ph type="title"/>
-          </p:nvPr>
-        </p:nvSpPr>
-        <p:spPr/>
-        <p:txBody>
-          <a:bodyPr/>
-          <a:lstStyle/>
-          <a:p>
-            <a:r>
-              <a:rPr lang="en-US" dirty="0" smtClean="0"/>
-              <a:t>// TODO:</a:t>
-            </a:r>
-            <a:endParaRPr lang="en-US" dirty="0"/>
-          </a:p>
-        </p:txBody>
-      </p:sp>
-      <p:sp>
-        <p:nvSpPr>
-          <p:cNvPr id="5" name="Text Placeholder 4"/>
-          <p:cNvSpPr>
-            <a:spLocks noGrp="1"/>
-          </p:cNvSpPr>
-          <p:nvPr>
-            <p:ph type="body" sz="half" idx="2"/>
-          </p:nvPr>
-        </p:nvSpPr>
-        <p:spPr/>
-        <p:txBody>
-          <a:bodyPr/>
-          <a:lstStyle/>
-          <a:p>
-            <a:endParaRPr lang="en-US"/>
-          </a:p>
-        </p:txBody>
-      </p:sp>
-    </p:spTree>
-    <p:extLst>
-      <p:ext uri="{BB962C8B-B14F-4D97-AF65-F5344CB8AC3E}">
-        <p14:creationId xmlns:p14="http://schemas.microsoft.com/office/powerpoint/2010/main" val="1667741265"/>
-      </p:ext>
-    </p:extLst>
-  </p:cSld>
-  <p:clrMapOvr>
-    <a:masterClrMapping/>
-  </p:clrMapOvr>
+  <p:timing>
+    <p:tnLst>
+      <p:par>
+        <p:cTn xmlns:p14="http://schemas.microsoft.com/office/powerpoint/2010/main" id="1" dur="indefinite" restart="never" nodeType="tmRoot"/>
+      </p:par>
+    </p:tnLst>
+  </p:timing>
 </p:sld>
 </file>
 
@@ -13201,7 +13224,147 @@
       </p:grpSpPr>
       <p:sp>
         <p:nvSpPr>
-          <p:cNvPr id="2" name="Slide Number Placeholder 1"/>
+          <p:cNvPr id="2" name="Content Placeholder 1"/>
+          <p:cNvSpPr>
+            <a:spLocks noGrp="1"/>
+          </p:cNvSpPr>
+          <p:nvPr>
+            <p:ph idx="1"/>
+          </p:nvPr>
+        </p:nvSpPr>
+        <p:spPr>
+          <a:xfrm>
+            <a:off x="457200" y="1645920"/>
+            <a:ext cx="8229600" cy="3606629"/>
+          </a:xfrm>
+        </p:spPr>
+        <p:txBody>
+          <a:bodyPr/>
+          <a:lstStyle/>
+          <a:p>
+            <a:r>
+              <a:rPr lang="en-US" dirty="0"/>
+              <a:t>Pull requests as part of </a:t>
+            </a:r>
+            <a:r>
+              <a:rPr lang="en-US" dirty="0" smtClean="0"/>
+              <a:t>workflow (core </a:t>
+            </a:r>
+            <a:r>
+              <a:rPr lang="en-US" dirty="0" smtClean="0"/>
+              <a:t>team + world)</a:t>
+            </a:r>
+            <a:endParaRPr lang="en-US" dirty="0"/>
+          </a:p>
+          <a:p>
+            <a:r>
+              <a:rPr lang="en-US" dirty="0" smtClean="0"/>
+              <a:t>Better Jenkins </a:t>
+            </a:r>
+            <a:r>
+              <a:rPr lang="en-US" dirty="0"/>
+              <a:t>+ </a:t>
+            </a:r>
+            <a:r>
+              <a:rPr lang="en-US" dirty="0" err="1" smtClean="0"/>
+              <a:t>GitHub</a:t>
+            </a:r>
+            <a:r>
+              <a:rPr lang="en-US" dirty="0" smtClean="0"/>
+              <a:t> </a:t>
+            </a:r>
+            <a:r>
+              <a:rPr lang="en-US" dirty="0" smtClean="0"/>
+              <a:t>integration</a:t>
+            </a:r>
+          </a:p>
+          <a:p>
+            <a:pPr lvl="1"/>
+            <a:r>
+              <a:rPr lang="en-US" dirty="0" smtClean="0"/>
+              <a:t>Jenkins plugins</a:t>
+            </a:r>
+          </a:p>
+          <a:p>
+            <a:pPr lvl="1"/>
+            <a:r>
+              <a:rPr lang="en-US" dirty="0" err="1" smtClean="0"/>
+              <a:t>GitHub</a:t>
+            </a:r>
+            <a:r>
+              <a:rPr lang="en-US" dirty="0" smtClean="0"/>
+              <a:t> hooks</a:t>
+            </a:r>
+            <a:endParaRPr lang="en-US" dirty="0" smtClean="0"/>
+          </a:p>
+          <a:p>
+            <a:r>
+              <a:rPr lang="en-US" dirty="0"/>
+              <a:t>How to </a:t>
+            </a:r>
+            <a:r>
+              <a:rPr lang="en-US" dirty="0" smtClean="0"/>
+              <a:t>contribute</a:t>
+            </a:r>
+          </a:p>
+          <a:p>
+            <a:pPr lvl="1"/>
+            <a:r>
+              <a:rPr lang="en-US" dirty="0" smtClean="0"/>
+              <a:t>Copyright, CLA, commit rights, whitelist</a:t>
+            </a:r>
+            <a:endParaRPr lang="en-US" dirty="0"/>
+          </a:p>
+          <a:p>
+            <a:r>
+              <a:rPr lang="en-US" dirty="0" smtClean="0"/>
+              <a:t>Commit </a:t>
+            </a:r>
+            <a:r>
+              <a:rPr lang="en-US" dirty="0"/>
+              <a:t>message template</a:t>
+            </a:r>
+          </a:p>
+          <a:p>
+            <a:r>
+              <a:rPr lang="en-US" dirty="0" smtClean="0"/>
+              <a:t>Packages for </a:t>
+            </a:r>
+            <a:r>
+              <a:rPr lang="en-US" dirty="0" err="1" smtClean="0"/>
+              <a:t>zpython</a:t>
+            </a:r>
+            <a:r>
+              <a:rPr lang="en-US" dirty="0" smtClean="0"/>
+              <a:t> + lib dependencies</a:t>
+            </a:r>
+          </a:p>
+          <a:p>
+            <a:r>
+              <a:rPr lang="en-US" dirty="0" smtClean="0"/>
+              <a:t>Naming conventions for packages / repos</a:t>
+            </a:r>
+          </a:p>
+          <a:p>
+            <a:pPr lvl="1"/>
+            <a:r>
+              <a:rPr lang="en-US" dirty="0" err="1" smtClean="0"/>
+              <a:t>zvm</a:t>
+            </a:r>
+            <a:r>
+              <a:rPr lang="en-US" dirty="0" smtClean="0"/>
+              <a:t>-* ?</a:t>
+            </a:r>
+            <a:endParaRPr lang="en-US" dirty="0"/>
+          </a:p>
+          <a:p>
+            <a:endParaRPr lang="en-US" dirty="0"/>
+          </a:p>
+        </p:txBody>
+      </p:sp>
+      <p:sp>
+        <p:nvSpPr>
+          <p:cNvPr id="3" name="Slide Number Placeholder 2"/>
           <p:cNvSpPr>
             <a:spLocks noGrp="1"/>
           </p:cNvSpPr>
@@ -13225,54 +13388,71 @@
       </p:sp>
       <p:sp>
         <p:nvSpPr>
-          <p:cNvPr id="3" name="TextBox 2"/>
-          <p:cNvSpPr txBox="1"/>
-          <p:nvPr/>
-        </p:nvSpPr>
-        <p:spPr>
-          <a:xfrm>
-            <a:off x="2699792" y="3057927"/>
-            <a:ext cx="3744416" cy="276999"/>
-          </a:xfrm>
-          <a:prstGeom prst="rect">
-            <a:avLst/>
-          </a:prstGeom>
-        </p:spPr>
-        <p:txBody>
-          <a:bodyPr wrap="square" lIns="0" tIns="0" rIns="0" bIns="0" rtlCol="0">
-            <a:spAutoFit/>
-          </a:bodyPr>
+          <p:cNvPr id="4" name="Title 3"/>
+          <p:cNvSpPr>
+            <a:spLocks noGrp="1"/>
+          </p:cNvSpPr>
+          <p:nvPr>
+            <p:ph type="title"/>
+          </p:nvPr>
+        </p:nvSpPr>
+        <p:spPr/>
+        <p:txBody>
+          <a:bodyPr/>
           <a:lstStyle/>
           <a:p>
-            <a:pPr algn="ctr">
-              <a:spcAft>
-                <a:spcPts val="1800"/>
-              </a:spcAft>
-            </a:pPr>
-            <a:r>
-              <a:rPr lang="en-US" dirty="0" smtClean="0">
-                <a:latin typeface="Helvetica"/>
-                <a:cs typeface="Helvetica"/>
-              </a:rPr>
-              <a:t>Feedback</a:t>
-            </a:r>
-            <a:endParaRPr lang="en-US" dirty="0" smtClean="0">
-              <a:latin typeface="Helvetica"/>
-              <a:cs typeface="Helvetica"/>
-            </a:endParaRPr>
+            <a:r>
+              <a:rPr lang="en-US" dirty="0"/>
+              <a:t>#</a:t>
+            </a:r>
+            <a:r>
+              <a:rPr lang="en-US" dirty="0" smtClean="0"/>
+              <a:t> </a:t>
+            </a:r>
+            <a:r>
+              <a:rPr lang="en-US" dirty="0" smtClean="0"/>
+              <a:t>TODO:</a:t>
+            </a:r>
+            <a:endParaRPr lang="en-US" dirty="0"/>
+          </a:p>
+        </p:txBody>
+      </p:sp>
+      <p:sp>
+        <p:nvSpPr>
+          <p:cNvPr id="5" name="Text Placeholder 4"/>
+          <p:cNvSpPr>
+            <a:spLocks noGrp="1"/>
+          </p:cNvSpPr>
+          <p:nvPr>
+            <p:ph type="body" sz="half" idx="2"/>
+          </p:nvPr>
+        </p:nvSpPr>
+        <p:spPr/>
+        <p:txBody>
+          <a:bodyPr/>
+          <a:lstStyle/>
+          <a:p>
+            <a:endParaRPr lang="en-US"/>
           </a:p>
         </p:txBody>
       </p:sp>
     </p:spTree>
     <p:extLst>
       <p:ext uri="{BB962C8B-B14F-4D97-AF65-F5344CB8AC3E}">
-        <p14:creationId xmlns:p14="http://schemas.microsoft.com/office/powerpoint/2010/main" val="1343781202"/>
+        <p14:creationId xmlns:p14="http://schemas.microsoft.com/office/powerpoint/2010/main" val="1667741265"/>
       </p:ext>
     </p:extLst>
   </p:cSld>
   <p:clrMapOvr>
     <a:masterClrMapping/>
   </p:clrMapOvr>
+  <p:timing>
+    <p:tnLst>
+      <p:par>
+        <p:cTn xmlns:p14="http://schemas.microsoft.com/office/powerpoint/2010/main" id="1" dur="indefinite" restart="never" nodeType="tmRoot"/>
+      </p:par>
+    </p:tnLst>
+  </p:timing>
 </p:sld>
 </file>
 

</xml_diff>